<commit_message>
Push post rencontre oliviers
</commit_message>
<xml_diff>
--- a/Moein_project/presentation_moein.pptx
+++ b/Moein_project/presentation_moein.pptx
@@ -111,6 +111,11 @@
       </a:defRPr>
     </a:lvl9pPr>
   </p:defaultTextStyle>
+  <p:extLst>
+    <p:ext uri="{EFAFB233-063F-42B5-8137-9DF3F51BA10A}">
+      <p15:sldGuideLst xmlns:p15="http://schemas.microsoft.com/office/powerpoint/2012/main"/>
+    </p:ext>
+  </p:extLst>
 </p:presentation>
 </file>
 
@@ -263,7 +268,7 @@
           <a:p>
             <a:fld id="{DD2A5933-3A8D-4F0D-AD1D-27789598D44F}" type="datetimeFigureOut">
               <a:rPr lang="en-CA" smtClean="0"/>
-              <a:t>2020-09-21</a:t>
+              <a:t>2020-09-22</a:t>
             </a:fld>
             <a:endParaRPr lang="en-CA"/>
           </a:p>
@@ -463,7 +468,7 @@
           <a:p>
             <a:fld id="{DD2A5933-3A8D-4F0D-AD1D-27789598D44F}" type="datetimeFigureOut">
               <a:rPr lang="en-CA" smtClean="0"/>
-              <a:t>2020-09-21</a:t>
+              <a:t>2020-09-22</a:t>
             </a:fld>
             <a:endParaRPr lang="en-CA"/>
           </a:p>
@@ -673,7 +678,7 @@
           <a:p>
             <a:fld id="{DD2A5933-3A8D-4F0D-AD1D-27789598D44F}" type="datetimeFigureOut">
               <a:rPr lang="en-CA" smtClean="0"/>
-              <a:t>2020-09-21</a:t>
+              <a:t>2020-09-22</a:t>
             </a:fld>
             <a:endParaRPr lang="en-CA"/>
           </a:p>
@@ -873,7 +878,7 @@
           <a:p>
             <a:fld id="{DD2A5933-3A8D-4F0D-AD1D-27789598D44F}" type="datetimeFigureOut">
               <a:rPr lang="en-CA" smtClean="0"/>
-              <a:t>2020-09-21</a:t>
+              <a:t>2020-09-22</a:t>
             </a:fld>
             <a:endParaRPr lang="en-CA"/>
           </a:p>
@@ -1149,7 +1154,7 @@
           <a:p>
             <a:fld id="{DD2A5933-3A8D-4F0D-AD1D-27789598D44F}" type="datetimeFigureOut">
               <a:rPr lang="en-CA" smtClean="0"/>
-              <a:t>2020-09-21</a:t>
+              <a:t>2020-09-22</a:t>
             </a:fld>
             <a:endParaRPr lang="en-CA"/>
           </a:p>
@@ -1417,7 +1422,7 @@
           <a:p>
             <a:fld id="{DD2A5933-3A8D-4F0D-AD1D-27789598D44F}" type="datetimeFigureOut">
               <a:rPr lang="en-CA" smtClean="0"/>
-              <a:t>2020-09-21</a:t>
+              <a:t>2020-09-22</a:t>
             </a:fld>
             <a:endParaRPr lang="en-CA"/>
           </a:p>
@@ -1832,7 +1837,7 @@
           <a:p>
             <a:fld id="{DD2A5933-3A8D-4F0D-AD1D-27789598D44F}" type="datetimeFigureOut">
               <a:rPr lang="en-CA" smtClean="0"/>
-              <a:t>2020-09-21</a:t>
+              <a:t>2020-09-22</a:t>
             </a:fld>
             <a:endParaRPr lang="en-CA"/>
           </a:p>
@@ -1974,7 +1979,7 @@
           <a:p>
             <a:fld id="{DD2A5933-3A8D-4F0D-AD1D-27789598D44F}" type="datetimeFigureOut">
               <a:rPr lang="en-CA" smtClean="0"/>
-              <a:t>2020-09-21</a:t>
+              <a:t>2020-09-22</a:t>
             </a:fld>
             <a:endParaRPr lang="en-CA"/>
           </a:p>
@@ -2087,7 +2092,7 @@
           <a:p>
             <a:fld id="{DD2A5933-3A8D-4F0D-AD1D-27789598D44F}" type="datetimeFigureOut">
               <a:rPr lang="en-CA" smtClean="0"/>
-              <a:t>2020-09-21</a:t>
+              <a:t>2020-09-22</a:t>
             </a:fld>
             <a:endParaRPr lang="en-CA"/>
           </a:p>
@@ -2400,7 +2405,7 @@
           <a:p>
             <a:fld id="{DD2A5933-3A8D-4F0D-AD1D-27789598D44F}" type="datetimeFigureOut">
               <a:rPr lang="en-CA" smtClean="0"/>
-              <a:t>2020-09-21</a:t>
+              <a:t>2020-09-22</a:t>
             </a:fld>
             <a:endParaRPr lang="en-CA"/>
           </a:p>
@@ -2689,7 +2694,7 @@
           <a:p>
             <a:fld id="{DD2A5933-3A8D-4F0D-AD1D-27789598D44F}" type="datetimeFigureOut">
               <a:rPr lang="en-CA" smtClean="0"/>
-              <a:t>2020-09-21</a:t>
+              <a:t>2020-09-22</a:t>
             </a:fld>
             <a:endParaRPr lang="en-CA"/>
           </a:p>
@@ -2932,7 +2937,7 @@
           <a:p>
             <a:fld id="{DD2A5933-3A8D-4F0D-AD1D-27789598D44F}" type="datetimeFigureOut">
               <a:rPr lang="en-CA" smtClean="0"/>
-              <a:t>2020-09-21</a:t>
+              <a:t>2020-09-22</a:t>
             </a:fld>
             <a:endParaRPr lang="en-CA"/>
           </a:p>
@@ -4418,8 +4423,8 @@
         </p:blipFill>
         <p:spPr>
           <a:xfrm>
-            <a:off x="2175915" y="2928674"/>
-            <a:ext cx="7840169" cy="2381582"/>
+            <a:off x="1456376" y="2591931"/>
+            <a:ext cx="9279247" cy="2818726"/>
           </a:xfrm>
           <a:prstGeom prst="rect">
             <a:avLst/>

</xml_diff>